<commit_message>
update chap 14 slides for spring 2020
</commit_message>
<xml_diff>
--- a/slides/Ch14_factorialExample.pptx
+++ b/slides/Ch14_factorialExample.pptx
@@ -1332,7 +1332,7 @@
           <a:p>
             <a:fld id="{9A141A46-A8C2-492D-A078-021772D6F488}" type="datetimeFigureOut">
               <a:rPr lang="en-US" smtClean="0"/>
-              <a:t>3/27/2018</a:t>
+              <a:t>3/31/2020</a:t>
             </a:fld>
             <a:endParaRPr lang="en-US"/>
           </a:p>
@@ -1570,7 +1570,7 @@
           <a:p>
             <a:fld id="{9A141A46-A8C2-492D-A078-021772D6F488}" type="datetimeFigureOut">
               <a:rPr lang="en-US" smtClean="0"/>
-              <a:t>3/27/2018</a:t>
+              <a:t>3/31/2020</a:t>
             </a:fld>
             <a:endParaRPr lang="en-US"/>
           </a:p>
@@ -1750,7 +1750,7 @@
           <a:p>
             <a:fld id="{9A141A46-A8C2-492D-A078-021772D6F488}" type="datetimeFigureOut">
               <a:rPr lang="en-US" smtClean="0"/>
-              <a:t>3/27/2018</a:t>
+              <a:t>3/31/2020</a:t>
             </a:fld>
             <a:endParaRPr lang="en-US"/>
           </a:p>
@@ -1920,7 +1920,7 @@
           <a:p>
             <a:fld id="{9A141A46-A8C2-492D-A078-021772D6F488}" type="datetimeFigureOut">
               <a:rPr lang="en-US" smtClean="0"/>
-              <a:t>3/27/2018</a:t>
+              <a:t>3/31/2020</a:t>
             </a:fld>
             <a:endParaRPr lang="en-US"/>
           </a:p>
@@ -2193,7 +2193,7 @@
           <a:p>
             <a:fld id="{9A141A46-A8C2-492D-A078-021772D6F488}" type="datetimeFigureOut">
               <a:rPr lang="en-US" smtClean="0"/>
-              <a:t>3/27/2018</a:t>
+              <a:t>3/31/2020</a:t>
             </a:fld>
             <a:endParaRPr lang="en-US"/>
           </a:p>
@@ -3394,7 +3394,7 @@
           <a:p>
             <a:fld id="{9A141A46-A8C2-492D-A078-021772D6F488}" type="datetimeFigureOut">
               <a:rPr lang="en-US" smtClean="0"/>
-              <a:t>3/27/2018</a:t>
+              <a:t>3/31/2020</a:t>
             </a:fld>
             <a:endParaRPr lang="en-US"/>
           </a:p>
@@ -3784,7 +3784,7 @@
           <a:p>
             <a:fld id="{9A141A46-A8C2-492D-A078-021772D6F488}" type="datetimeFigureOut">
               <a:rPr lang="en-US" smtClean="0"/>
-              <a:t>3/27/2018</a:t>
+              <a:t>3/31/2020</a:t>
             </a:fld>
             <a:endParaRPr lang="en-US"/>
           </a:p>
@@ -3907,7 +3907,7 @@
           <a:p>
             <a:fld id="{9A141A46-A8C2-492D-A078-021772D6F488}" type="datetimeFigureOut">
               <a:rPr lang="en-US" smtClean="0"/>
-              <a:t>3/27/2018</a:t>
+              <a:t>3/31/2020</a:t>
             </a:fld>
             <a:endParaRPr lang="en-US"/>
           </a:p>
@@ -4002,7 +4002,7 @@
           <a:p>
             <a:fld id="{9A141A46-A8C2-492D-A078-021772D6F488}" type="datetimeFigureOut">
               <a:rPr lang="en-US" smtClean="0"/>
-              <a:t>3/27/2018</a:t>
+              <a:t>3/31/2020</a:t>
             </a:fld>
             <a:endParaRPr lang="en-US"/>
           </a:p>
@@ -4765,7 +4765,7 @@
           <a:p>
             <a:fld id="{9A141A46-A8C2-492D-A078-021772D6F488}" type="datetimeFigureOut">
               <a:rPr lang="en-US" smtClean="0"/>
-              <a:t>3/27/2018</a:t>
+              <a:t>3/31/2020</a:t>
             </a:fld>
             <a:endParaRPr lang="en-US"/>
           </a:p>
@@ -5605,7 +5605,7 @@
           <a:p>
             <a:fld id="{9A141A46-A8C2-492D-A078-021772D6F488}" type="datetimeFigureOut">
               <a:rPr lang="en-US" smtClean="0"/>
-              <a:t>3/27/2018</a:t>
+              <a:t>3/31/2020</a:t>
             </a:fld>
             <a:endParaRPr lang="en-US"/>
           </a:p>
@@ -5832,7 +5832,7 @@
           <a:p>
             <a:fld id="{9A141A46-A8C2-492D-A078-021772D6F488}" type="datetimeFigureOut">
               <a:rPr lang="en-US" smtClean="0"/>
-              <a:t>3/27/2018</a:t>
+              <a:t>3/31/2020</a:t>
             </a:fld>
             <a:endParaRPr lang="en-US"/>
           </a:p>
@@ -6870,7 +6870,15 @@
           <a:p>
             <a:r>
               <a:rPr lang="en-US" dirty="0"/>
-              <a:t>Cohen – chapter 13 textbook example</a:t>
+              <a:t>Cohen – chapter </a:t>
+            </a:r>
+            <a:r>
+              <a:rPr lang="en-US" dirty="0" smtClean="0"/>
+              <a:t>14 </a:t>
+            </a:r>
+            <a:r>
+              <a:rPr lang="en-US" dirty="0"/>
+              <a:t>textbook example</a:t>
             </a:r>
           </a:p>
         </p:txBody>
@@ -6885,6 +6893,13 @@
   <p:clrMapOvr>
     <a:masterClrMapping/>
   </p:clrMapOvr>
+  <p:timing>
+    <p:tnLst>
+      <p:par>
+        <p:cTn id="1" dur="indefinite" restart="never" nodeType="tmRoot"/>
+      </p:par>
+    </p:tnLst>
+  </p:timing>
 </p:sld>
 </file>
 
@@ -9168,8 +9183,8 @@
           </a:p>
         </p:txBody>
       </p:sp>
-      <mc:AlternateContent xmlns:mc="http://schemas.openxmlformats.org/markup-compatibility/2006">
-        <mc:Choice xmlns:a14="http://schemas.microsoft.com/office/drawing/2010/main" Requires="a14">
+      <mc:AlternateContent xmlns:mc="http://schemas.openxmlformats.org/markup-compatibility/2006" xmlns:a14="http://schemas.microsoft.com/office/drawing/2010/main">
+        <mc:Choice Requires="a14">
           <p:sp>
             <p:nvSpPr>
               <p:cNvPr id="36" name="Rectangle 35"/>
@@ -9343,7 +9358,7 @@
             </p:txBody>
           </p:sp>
         </mc:Choice>
-        <mc:Fallback>
+        <mc:Fallback xmlns="">
           <p:sp>
             <p:nvSpPr>
               <p:cNvPr id="36" name="Rectangle 35"/>
@@ -10228,6 +10243,13 @@
       </p:transition>
     </mc:Fallback>
   </mc:AlternateContent>
+  <p:timing>
+    <p:tnLst>
+      <p:par>
+        <p:cTn id="1" dur="indefinite" restart="never" nodeType="tmRoot"/>
+      </p:par>
+    </p:tnLst>
+  </p:timing>
 </p:sld>
 </file>
 
@@ -15510,6 +15532,13 @@
   <p:clrMapOvr>
     <a:masterClrMapping/>
   </p:clrMapOvr>
+  <p:timing>
+    <p:tnLst>
+      <p:par>
+        <p:cTn id="1" dur="indefinite" restart="never" nodeType="tmRoot"/>
+      </p:par>
+    </p:tnLst>
+  </p:timing>
 </p:sld>
 </file>
 
@@ -26583,21 +26612,30 @@
                             </p:childTnLst>
                           </p:cTn>
                         </p:par>
+                      </p:childTnLst>
+                    </p:cTn>
+                  </p:par>
+                  <p:par>
+                    <p:cTn id="8" fill="hold">
+                      <p:stCondLst>
+                        <p:cond delay="indefinite"/>
+                      </p:stCondLst>
+                      <p:childTnLst>
                         <p:par>
-                          <p:cTn id="8" fill="hold">
+                          <p:cTn id="9" fill="hold">
                             <p:stCondLst>
-                              <p:cond delay="500"/>
+                              <p:cond delay="0"/>
                             </p:stCondLst>
                             <p:childTnLst>
                               <p:par>
-                                <p:cTn id="9" presetID="10" presetClass="entr" presetSubtype="0" fill="hold" nodeType="afterEffect">
+                                <p:cTn id="10" presetID="10" presetClass="entr" presetSubtype="0" fill="hold" nodeType="clickEffect">
                                   <p:stCondLst>
                                     <p:cond delay="0"/>
                                   </p:stCondLst>
                                   <p:childTnLst>
                                     <p:set>
                                       <p:cBhvr>
-                                        <p:cTn id="10" dur="1" fill="hold">
+                                        <p:cTn id="11" dur="1" fill="hold">
                                           <p:stCondLst>
                                             <p:cond delay="0"/>
                                           </p:stCondLst>
@@ -26615,7 +26653,7 @@
                                     </p:set>
                                     <p:animEffect transition="in" filter="fade">
                                       <p:cBhvr>
-                                        <p:cTn id="11" dur="500"/>
+                                        <p:cTn id="12" dur="500"/>
                                         <p:tgtEl>
                                           <p:spTgt spid="8"/>
                                         </p:tgtEl>
@@ -28977,7 +29015,7 @@
         </p:blipFill>
         <p:spPr>
           <a:xfrm>
-            <a:off x="973940" y="5884533"/>
+            <a:off x="1027409" y="5884533"/>
             <a:ext cx="2693994" cy="788199"/>
           </a:xfrm>
           <a:prstGeom prst="rect">
@@ -29010,9 +29048,6 @@
                     <p:cTn id="3" fill="hold">
                       <p:stCondLst>
                         <p:cond delay="indefinite"/>
-                        <p:cond evt="onBegin" delay="0">
-                          <p:tn val="2"/>
-                        </p:cond>
                       </p:stCondLst>
                       <p:childTnLst>
                         <p:par>
@@ -29022,7 +29057,7 @@
                             </p:stCondLst>
                             <p:childTnLst>
                               <p:par>
-                                <p:cTn id="5" presetID="22" presetClass="entr" presetSubtype="8" fill="hold" nodeType="afterEffect">
+                                <p:cTn id="5" presetID="22" presetClass="entr" presetSubtype="8" fill="hold" nodeType="clickEffect">
                                   <p:stCondLst>
                                     <p:cond delay="0"/>
                                   </p:stCondLst>
@@ -29103,21 +29138,136 @@
                             </p:childTnLst>
                           </p:cTn>
                         </p:par>
+                      </p:childTnLst>
+                    </p:cTn>
+                  </p:par>
+                  <p:par>
+                    <p:cTn id="12" fill="hold">
+                      <p:stCondLst>
+                        <p:cond delay="indefinite"/>
+                      </p:stCondLst>
+                      <p:childTnLst>
                         <p:par>
-                          <p:cTn id="12" fill="hold">
+                          <p:cTn id="13" fill="hold">
                             <p:stCondLst>
-                              <p:cond delay="1000"/>
+                              <p:cond delay="0"/>
                             </p:stCondLst>
                             <p:childTnLst>
                               <p:par>
-                                <p:cTn id="13" presetID="22" presetClass="entr" presetSubtype="8" fill="hold" nodeType="afterEffect">
+                                <p:cTn id="14" presetID="10" presetClass="entr" presetSubtype="0" fill="hold" nodeType="clickEffect">
                                   <p:stCondLst>
                                     <p:cond delay="0"/>
                                   </p:stCondLst>
                                   <p:childTnLst>
                                     <p:set>
                                       <p:cBhvr>
-                                        <p:cTn id="14" dur="1" fill="hold">
+                                        <p:cTn id="15" dur="1" fill="hold">
+                                          <p:stCondLst>
+                                            <p:cond delay="0"/>
+                                          </p:stCondLst>
+                                        </p:cTn>
+                                        <p:tgtEl>
+                                          <p:spTgt spid="3"/>
+                                        </p:tgtEl>
+                                        <p:attrNameLst>
+                                          <p:attrName>style.visibility</p:attrName>
+                                        </p:attrNameLst>
+                                      </p:cBhvr>
+                                      <p:to>
+                                        <p:strVal val="visible"/>
+                                      </p:to>
+                                    </p:set>
+                                    <p:animEffect transition="in" filter="fade">
+                                      <p:cBhvr>
+                                        <p:cTn id="16" dur="500"/>
+                                        <p:tgtEl>
+                                          <p:spTgt spid="3"/>
+                                        </p:tgtEl>
+                                      </p:cBhvr>
+                                    </p:animEffect>
+                                  </p:childTnLst>
+                                </p:cTn>
+                              </p:par>
+                            </p:childTnLst>
+                          </p:cTn>
+                        </p:par>
+                      </p:childTnLst>
+                    </p:cTn>
+                  </p:par>
+                  <p:par>
+                    <p:cTn id="17" fill="hold">
+                      <p:stCondLst>
+                        <p:cond delay="indefinite"/>
+                      </p:stCondLst>
+                      <p:childTnLst>
+                        <p:par>
+                          <p:cTn id="18" fill="hold">
+                            <p:stCondLst>
+                              <p:cond delay="0"/>
+                            </p:stCondLst>
+                            <p:childTnLst>
+                              <p:par>
+                                <p:cTn id="19" presetID="10" presetClass="entr" presetSubtype="0" fill="hold" nodeType="clickEffect">
+                                  <p:stCondLst>
+                                    <p:cond delay="0"/>
+                                  </p:stCondLst>
+                                  <p:childTnLst>
+                                    <p:set>
+                                      <p:cBhvr>
+                                        <p:cTn id="20" dur="1" fill="hold">
+                                          <p:stCondLst>
+                                            <p:cond delay="0"/>
+                                          </p:stCondLst>
+                                        </p:cTn>
+                                        <p:tgtEl>
+                                          <p:spTgt spid="6"/>
+                                        </p:tgtEl>
+                                        <p:attrNameLst>
+                                          <p:attrName>style.visibility</p:attrName>
+                                        </p:attrNameLst>
+                                      </p:cBhvr>
+                                      <p:to>
+                                        <p:strVal val="visible"/>
+                                      </p:to>
+                                    </p:set>
+                                    <p:animEffect transition="in" filter="fade">
+                                      <p:cBhvr>
+                                        <p:cTn id="21" dur="500"/>
+                                        <p:tgtEl>
+                                          <p:spTgt spid="6"/>
+                                        </p:tgtEl>
+                                      </p:cBhvr>
+                                    </p:animEffect>
+                                  </p:childTnLst>
+                                </p:cTn>
+                              </p:par>
+                            </p:childTnLst>
+                          </p:cTn>
+                        </p:par>
+                      </p:childTnLst>
+                    </p:cTn>
+                  </p:par>
+                  <p:par>
+                    <p:cTn id="22" fill="hold">
+                      <p:stCondLst>
+                        <p:cond delay="indefinite"/>
+                      </p:stCondLst>
+                      <p:childTnLst>
+                        <p:par>
+                          <p:cTn id="23" fill="hold">
+                            <p:stCondLst>
+                              <p:cond delay="0"/>
+                            </p:stCondLst>
+                            <p:childTnLst>
+                              <p:par>
+                                <p:cTn id="24" presetID="22" presetClass="entr" presetSubtype="8" fill="hold" nodeType="clickEffect">
+                                  <p:stCondLst>
+                                    <p:cond delay="0"/>
+                                  </p:stCondLst>
+                                  <p:childTnLst>
+                                    <p:set>
+                                      <p:cBhvr>
+                                        <p:cTn id="25" dur="1" fill="hold">
                                           <p:stCondLst>
                                             <p:cond delay="0"/>
                                           </p:stCondLst>
@@ -29135,7 +29285,7 @@
                                     </p:set>
                                     <p:animEffect transition="in" filter="wipe(left)">
                                       <p:cBhvr>
-                                        <p:cTn id="15" dur="500"/>
+                                        <p:cTn id="26" dur="500"/>
                                         <p:tgtEl>
                                           <p:spTgt spid="25"/>
                                         </p:tgtEl>
@@ -29148,20 +29298,20 @@
                           </p:cTn>
                         </p:par>
                         <p:par>
-                          <p:cTn id="16" fill="hold">
+                          <p:cTn id="27" fill="hold">
                             <p:stCondLst>
-                              <p:cond delay="1500"/>
+                              <p:cond delay="500"/>
                             </p:stCondLst>
                             <p:childTnLst>
                               <p:par>
-                                <p:cTn id="17" presetID="10" presetClass="entr" presetSubtype="0" fill="hold" grpId="0" nodeType="afterEffect">
+                                <p:cTn id="28" presetID="10" presetClass="entr" presetSubtype="0" fill="hold" grpId="0" nodeType="afterEffect">
                                   <p:stCondLst>
                                     <p:cond delay="0"/>
                                   </p:stCondLst>
                                   <p:childTnLst>
                                     <p:set>
                                       <p:cBhvr>
-                                        <p:cTn id="18" dur="1" fill="hold">
+                                        <p:cTn id="29" dur="1" fill="hold">
                                           <p:stCondLst>
                                             <p:cond delay="0"/>
                                           </p:stCondLst>
@@ -29179,7 +29329,7 @@
                                     </p:set>
                                     <p:animEffect transition="in" filter="fade">
                                       <p:cBhvr>
-                                        <p:cTn id="19" dur="500"/>
+                                        <p:cTn id="30" dur="500"/>
                                         <p:tgtEl>
                                           <p:spTgt spid="14"/>
                                         </p:tgtEl>
@@ -29191,21 +29341,180 @@
                             </p:childTnLst>
                           </p:cTn>
                         </p:par>
+                      </p:childTnLst>
+                    </p:cTn>
+                  </p:par>
+                  <p:par>
+                    <p:cTn id="31" fill="hold">
+                      <p:stCondLst>
+                        <p:cond delay="indefinite"/>
+                      </p:stCondLst>
+                      <p:childTnLst>
                         <p:par>
-                          <p:cTn id="20" fill="hold">
+                          <p:cTn id="32" fill="hold">
                             <p:stCondLst>
-                              <p:cond delay="2000"/>
+                              <p:cond delay="0"/>
                             </p:stCondLst>
                             <p:childTnLst>
                               <p:par>
-                                <p:cTn id="21" presetID="10" presetClass="entr" presetSubtype="0" fill="hold" grpId="0" nodeType="afterEffect">
+                                <p:cTn id="33" presetID="10" presetClass="entr" presetSubtype="0" fill="hold" nodeType="clickEffect">
                                   <p:stCondLst>
                                     <p:cond delay="0"/>
                                   </p:stCondLst>
                                   <p:childTnLst>
                                     <p:set>
                                       <p:cBhvr>
-                                        <p:cTn id="22" dur="1" fill="hold">
+                                        <p:cTn id="34" dur="1" fill="hold">
+                                          <p:stCondLst>
+                                            <p:cond delay="0"/>
+                                          </p:stCondLst>
+                                        </p:cTn>
+                                        <p:tgtEl>
+                                          <p:spTgt spid="4"/>
+                                        </p:tgtEl>
+                                        <p:attrNameLst>
+                                          <p:attrName>style.visibility</p:attrName>
+                                        </p:attrNameLst>
+                                      </p:cBhvr>
+                                      <p:to>
+                                        <p:strVal val="visible"/>
+                                      </p:to>
+                                    </p:set>
+                                    <p:animEffect transition="in" filter="fade">
+                                      <p:cBhvr>
+                                        <p:cTn id="35" dur="500"/>
+                                        <p:tgtEl>
+                                          <p:spTgt spid="4"/>
+                                        </p:tgtEl>
+                                      </p:cBhvr>
+                                    </p:animEffect>
+                                  </p:childTnLst>
+                                </p:cTn>
+                              </p:par>
+                            </p:childTnLst>
+                          </p:cTn>
+                        </p:par>
+                      </p:childTnLst>
+                    </p:cTn>
+                  </p:par>
+                  <p:par>
+                    <p:cTn id="36" fill="hold">
+                      <p:stCondLst>
+                        <p:cond delay="indefinite"/>
+                      </p:stCondLst>
+                      <p:childTnLst>
+                        <p:par>
+                          <p:cTn id="37" fill="hold">
+                            <p:stCondLst>
+                              <p:cond delay="0"/>
+                            </p:stCondLst>
+                            <p:childTnLst>
+                              <p:par>
+                                <p:cTn id="38" presetID="10" presetClass="entr" presetSubtype="0" fill="hold" nodeType="clickEffect">
+                                  <p:stCondLst>
+                                    <p:cond delay="0"/>
+                                  </p:stCondLst>
+                                  <p:childTnLst>
+                                    <p:set>
+                                      <p:cBhvr>
+                                        <p:cTn id="39" dur="1" fill="hold">
+                                          <p:stCondLst>
+                                            <p:cond delay="0"/>
+                                          </p:stCondLst>
+                                        </p:cTn>
+                                        <p:tgtEl>
+                                          <p:spTgt spid="5"/>
+                                        </p:tgtEl>
+                                        <p:attrNameLst>
+                                          <p:attrName>style.visibility</p:attrName>
+                                        </p:attrNameLst>
+                                      </p:cBhvr>
+                                      <p:to>
+                                        <p:strVal val="visible"/>
+                                      </p:to>
+                                    </p:set>
+                                    <p:animEffect transition="in" filter="fade">
+                                      <p:cBhvr>
+                                        <p:cTn id="40" dur="500"/>
+                                        <p:tgtEl>
+                                          <p:spTgt spid="5"/>
+                                        </p:tgtEl>
+                                      </p:cBhvr>
+                                    </p:animEffect>
+                                  </p:childTnLst>
+                                </p:cTn>
+                              </p:par>
+                            </p:childTnLst>
+                          </p:cTn>
+                        </p:par>
+                      </p:childTnLst>
+                    </p:cTn>
+                  </p:par>
+                  <p:par>
+                    <p:cTn id="41" fill="hold">
+                      <p:stCondLst>
+                        <p:cond delay="indefinite"/>
+                      </p:stCondLst>
+                      <p:childTnLst>
+                        <p:par>
+                          <p:cTn id="42" fill="hold">
+                            <p:stCondLst>
+                              <p:cond delay="0"/>
+                            </p:stCondLst>
+                            <p:childTnLst>
+                              <p:par>
+                                <p:cTn id="43" presetID="10" presetClass="entr" presetSubtype="0" fill="hold" nodeType="clickEffect">
+                                  <p:stCondLst>
+                                    <p:cond delay="0"/>
+                                  </p:stCondLst>
+                                  <p:childTnLst>
+                                    <p:set>
+                                      <p:cBhvr>
+                                        <p:cTn id="44" dur="1" fill="hold">
+                                          <p:stCondLst>
+                                            <p:cond delay="0"/>
+                                          </p:stCondLst>
+                                        </p:cTn>
+                                        <p:tgtEl>
+                                          <p:spTgt spid="8"/>
+                                        </p:tgtEl>
+                                        <p:attrNameLst>
+                                          <p:attrName>style.visibility</p:attrName>
+                                        </p:attrNameLst>
+                                      </p:cBhvr>
+                                      <p:to>
+                                        <p:strVal val="visible"/>
+                                      </p:to>
+                                    </p:set>
+                                    <p:animEffect transition="in" filter="fade">
+                                      <p:cBhvr>
+                                        <p:cTn id="45" dur="500"/>
+                                        <p:tgtEl>
+                                          <p:spTgt spid="8"/>
+                                        </p:tgtEl>
+                                      </p:cBhvr>
+                                    </p:animEffect>
+                                  </p:childTnLst>
+                                </p:cTn>
+                              </p:par>
+                            </p:childTnLst>
+                          </p:cTn>
+                        </p:par>
+                        <p:par>
+                          <p:cTn id="46" fill="hold">
+                            <p:stCondLst>
+                              <p:cond delay="500"/>
+                            </p:stCondLst>
+                            <p:childTnLst>
+                              <p:par>
+                                <p:cTn id="47" presetID="10" presetClass="entr" presetSubtype="0" fill="hold" grpId="0" nodeType="afterEffect">
+                                  <p:stCondLst>
+                                    <p:cond delay="0"/>
+                                  </p:stCondLst>
+                                  <p:childTnLst>
+                                    <p:set>
+                                      <p:cBhvr>
+                                        <p:cTn id="48" dur="1" fill="hold">
                                           <p:stCondLst>
                                             <p:cond delay="0"/>
                                           </p:stCondLst>
@@ -29223,7 +29532,7 @@
                                     </p:set>
                                     <p:animEffect transition="in" filter="fade">
                                       <p:cBhvr>
-                                        <p:cTn id="23" dur="500"/>
+                                        <p:cTn id="49" dur="500"/>
                                         <p:tgtEl>
                                           <p:spTgt spid="15"/>
                                         </p:tgtEl>
@@ -35649,6 +35958,37 @@
           </a:prstGeom>
         </p:spPr>
       </p:pic>
+      <p:cxnSp>
+        <p:nvCxnSpPr>
+          <p:cNvPr id="6" name="Straight Connector 5"/>
+          <p:cNvCxnSpPr/>
+          <p:nvPr/>
+        </p:nvCxnSpPr>
+        <p:spPr>
+          <a:xfrm flipV="1">
+            <a:off x="5989983" y="5440017"/>
+            <a:ext cx="4465982" cy="26505"/>
+          </a:xfrm>
+          <a:prstGeom prst="line">
+            <a:avLst/>
+          </a:prstGeom>
+          <a:ln w="28575"/>
+        </p:spPr>
+        <p:style>
+          <a:lnRef idx="1">
+            <a:schemeClr val="accent1"/>
+          </a:lnRef>
+          <a:fillRef idx="0">
+            <a:schemeClr val="accent1"/>
+          </a:fillRef>
+          <a:effectRef idx="0">
+            <a:schemeClr val="accent1"/>
+          </a:effectRef>
+          <a:fontRef idx="minor">
+            <a:schemeClr val="tx1"/>
+          </a:fontRef>
+        </p:style>
+      </p:cxnSp>
     </p:spTree>
     <p:extLst>
       <p:ext uri="{BB962C8B-B14F-4D97-AF65-F5344CB8AC3E}">
@@ -35705,7 +36045,7 @@
                                           </p:stCondLst>
                                         </p:cTn>
                                         <p:tgtEl>
-                                          <p:spTgt spid="14"/>
+                                          <p:spTgt spid="9"/>
                                         </p:tgtEl>
                                         <p:attrNameLst>
                                           <p:attrName>style.visibility</p:attrName>
@@ -35719,6 +36059,112 @@
                                       <p:cBhvr>
                                         <p:cTn id="7" dur="500"/>
                                         <p:tgtEl>
+                                          <p:spTgt spid="9"/>
+                                        </p:tgtEl>
+                                      </p:cBhvr>
+                                    </p:animEffect>
+                                  </p:childTnLst>
+                                </p:cTn>
+                              </p:par>
+                            </p:childTnLst>
+                          </p:cTn>
+                        </p:par>
+                      </p:childTnLst>
+                    </p:cTn>
+                  </p:par>
+                  <p:par>
+                    <p:cTn id="8" fill="hold">
+                      <p:stCondLst>
+                        <p:cond delay="indefinite"/>
+                      </p:stCondLst>
+                      <p:childTnLst>
+                        <p:par>
+                          <p:cTn id="9" fill="hold">
+                            <p:stCondLst>
+                              <p:cond delay="0"/>
+                            </p:stCondLst>
+                            <p:childTnLst>
+                              <p:par>
+                                <p:cTn id="10" presetID="22" presetClass="entr" presetSubtype="8" fill="hold" nodeType="clickEffect">
+                                  <p:stCondLst>
+                                    <p:cond delay="0"/>
+                                  </p:stCondLst>
+                                  <p:childTnLst>
+                                    <p:set>
+                                      <p:cBhvr>
+                                        <p:cTn id="11" dur="1" fill="hold">
+                                          <p:stCondLst>
+                                            <p:cond delay="0"/>
+                                          </p:stCondLst>
+                                        </p:cTn>
+                                        <p:tgtEl>
+                                          <p:spTgt spid="6"/>
+                                        </p:tgtEl>
+                                        <p:attrNameLst>
+                                          <p:attrName>style.visibility</p:attrName>
+                                        </p:attrNameLst>
+                                      </p:cBhvr>
+                                      <p:to>
+                                        <p:strVal val="visible"/>
+                                      </p:to>
+                                    </p:set>
+                                    <p:animEffect transition="in" filter="wipe(left)">
+                                      <p:cBhvr>
+                                        <p:cTn id="12" dur="500"/>
+                                        <p:tgtEl>
+                                          <p:spTgt spid="6"/>
+                                        </p:tgtEl>
+                                      </p:cBhvr>
+                                    </p:animEffect>
+                                  </p:childTnLst>
+                                </p:cTn>
+                              </p:par>
+                            </p:childTnLst>
+                          </p:cTn>
+                        </p:par>
+                      </p:childTnLst>
+                    </p:cTn>
+                  </p:par>
+                  <p:par>
+                    <p:cTn id="13" fill="hold">
+                      <p:stCondLst>
+                        <p:cond delay="indefinite"/>
+                      </p:stCondLst>
+                      <p:childTnLst>
+                        <p:par>
+                          <p:cTn id="14" fill="hold">
+                            <p:stCondLst>
+                              <p:cond delay="0"/>
+                            </p:stCondLst>
+                            <p:childTnLst>
+                              <p:par>
+                                <p:cTn id="15" presetID="10" presetClass="entr" presetSubtype="0" fill="hold" nodeType="clickEffect">
+                                  <p:stCondLst>
+                                    <p:cond delay="0"/>
+                                  </p:stCondLst>
+                                  <p:childTnLst>
+                                    <p:set>
+                                      <p:cBhvr>
+                                        <p:cTn id="16" dur="1" fill="hold">
+                                          <p:stCondLst>
+                                            <p:cond delay="0"/>
+                                          </p:stCondLst>
+                                        </p:cTn>
+                                        <p:tgtEl>
+                                          <p:spTgt spid="14"/>
+                                        </p:tgtEl>
+                                        <p:attrNameLst>
+                                          <p:attrName>style.visibility</p:attrName>
+                                        </p:attrNameLst>
+                                      </p:cBhvr>
+                                      <p:to>
+                                        <p:strVal val="visible"/>
+                                      </p:to>
+                                    </p:set>
+                                    <p:animEffect transition="in" filter="fade">
+                                      <p:cBhvr>
+                                        <p:cTn id="17" dur="500"/>
+                                        <p:tgtEl>
                                           <p:spTgt spid="14"/>
                                         </p:tgtEl>
                                       </p:cBhvr>
@@ -35730,20 +36176,20 @@
                           </p:cTn>
                         </p:par>
                         <p:par>
-                          <p:cTn id="8" fill="hold">
+                          <p:cTn id="18" fill="hold">
                             <p:stCondLst>
                               <p:cond delay="500"/>
                             </p:stCondLst>
                             <p:childTnLst>
                               <p:par>
-                                <p:cTn id="9" presetID="10" presetClass="entr" presetSubtype="0" fill="hold" grpId="0" nodeType="afterEffect">
+                                <p:cTn id="19" presetID="10" presetClass="entr" presetSubtype="0" fill="hold" grpId="0" nodeType="afterEffect">
                                   <p:stCondLst>
                                     <p:cond delay="0"/>
                                   </p:stCondLst>
                                   <p:childTnLst>
                                     <p:set>
                                       <p:cBhvr>
-                                        <p:cTn id="10" dur="1" fill="hold">
+                                        <p:cTn id="20" dur="1" fill="hold">
                                           <p:stCondLst>
                                             <p:cond delay="0"/>
                                           </p:stCondLst>
@@ -35761,7 +36207,7 @@
                                     </p:set>
                                     <p:animEffect transition="in" filter="fade">
                                       <p:cBhvr>
-                                        <p:cTn id="11" dur="500"/>
+                                        <p:cTn id="21" dur="500"/>
                                         <p:tgtEl>
                                           <p:spTgt spid="11"/>
                                         </p:tgtEl>
@@ -35771,14 +36217,14 @@
                                 </p:cTn>
                               </p:par>
                               <p:par>
-                                <p:cTn id="12" presetID="10" presetClass="entr" presetSubtype="0" fill="hold" grpId="0" nodeType="withEffect">
+                                <p:cTn id="22" presetID="10" presetClass="entr" presetSubtype="0" fill="hold" grpId="0" nodeType="withEffect">
                                   <p:stCondLst>
                                     <p:cond delay="0"/>
                                   </p:stCondLst>
                                   <p:childTnLst>
                                     <p:set>
                                       <p:cBhvr>
-                                        <p:cTn id="13" dur="1" fill="hold">
+                                        <p:cTn id="23" dur="1" fill="hold">
                                           <p:stCondLst>
                                             <p:cond delay="0"/>
                                           </p:stCondLst>
@@ -35796,7 +36242,7 @@
                                     </p:set>
                                     <p:animEffect transition="in" filter="fade">
                                       <p:cBhvr>
-                                        <p:cTn id="14" dur="500"/>
+                                        <p:cTn id="24" dur="500"/>
                                         <p:tgtEl>
                                           <p:spTgt spid="12"/>
                                         </p:tgtEl>
@@ -35806,14 +36252,14 @@
                                 </p:cTn>
                               </p:par>
                               <p:par>
-                                <p:cTn id="15" presetID="10" presetClass="entr" presetSubtype="0" fill="hold" grpId="0" nodeType="withEffect">
+                                <p:cTn id="25" presetID="10" presetClass="entr" presetSubtype="0" fill="hold" grpId="0" nodeType="withEffect">
                                   <p:stCondLst>
                                     <p:cond delay="0"/>
                                   </p:stCondLst>
                                   <p:childTnLst>
                                     <p:set>
                                       <p:cBhvr>
-                                        <p:cTn id="16" dur="1" fill="hold">
+                                        <p:cTn id="26" dur="1" fill="hold">
                                           <p:stCondLst>
                                             <p:cond delay="0"/>
                                           </p:stCondLst>
@@ -35831,7 +36277,7 @@
                                     </p:set>
                                     <p:animEffect transition="in" filter="fade">
                                       <p:cBhvr>
-                                        <p:cTn id="17" dur="500"/>
+                                        <p:cTn id="27" dur="500"/>
                                         <p:tgtEl>
                                           <p:spTgt spid="16"/>
                                         </p:tgtEl>
@@ -35841,14 +36287,14 @@
                                 </p:cTn>
                               </p:par>
                               <p:par>
-                                <p:cTn id="18" presetID="10" presetClass="entr" presetSubtype="0" fill="hold" grpId="0" nodeType="withEffect">
+                                <p:cTn id="28" presetID="10" presetClass="entr" presetSubtype="0" fill="hold" grpId="0" nodeType="withEffect">
                                   <p:stCondLst>
                                     <p:cond delay="0"/>
                                   </p:stCondLst>
                                   <p:childTnLst>
                                     <p:set>
                                       <p:cBhvr>
-                                        <p:cTn id="19" dur="1" fill="hold">
+                                        <p:cTn id="29" dur="1" fill="hold">
                                           <p:stCondLst>
                                             <p:cond delay="0"/>
                                           </p:stCondLst>
@@ -35866,7 +36312,7 @@
                                     </p:set>
                                     <p:animEffect transition="in" filter="fade">
                                       <p:cBhvr>
-                                        <p:cTn id="20" dur="500"/>
+                                        <p:cTn id="30" dur="500"/>
                                         <p:tgtEl>
                                           <p:spTgt spid="18"/>
                                         </p:tgtEl>
@@ -35876,14 +36322,14 @@
                                 </p:cTn>
                               </p:par>
                               <p:par>
-                                <p:cTn id="21" presetID="10" presetClass="entr" presetSubtype="0" fill="hold" grpId="0" nodeType="withEffect">
+                                <p:cTn id="31" presetID="10" presetClass="entr" presetSubtype="0" fill="hold" grpId="0" nodeType="withEffect">
                                   <p:stCondLst>
                                     <p:cond delay="0"/>
                                   </p:stCondLst>
                                   <p:childTnLst>
                                     <p:set>
                                       <p:cBhvr>
-                                        <p:cTn id="22" dur="1" fill="hold">
+                                        <p:cTn id="32" dur="1" fill="hold">
                                           <p:stCondLst>
                                             <p:cond delay="0"/>
                                           </p:stCondLst>
@@ -35901,7 +36347,7 @@
                                     </p:set>
                                     <p:animEffect transition="in" filter="fade">
                                       <p:cBhvr>
-                                        <p:cTn id="23" dur="500"/>
+                                        <p:cTn id="33" dur="500"/>
                                         <p:tgtEl>
                                           <p:spTgt spid="19"/>
                                         </p:tgtEl>
@@ -35917,26 +36363,26 @@
                     </p:cTn>
                   </p:par>
                   <p:par>
-                    <p:cTn id="24" fill="hold">
+                    <p:cTn id="34" fill="hold">
                       <p:stCondLst>
                         <p:cond delay="indefinite"/>
                       </p:stCondLst>
                       <p:childTnLst>
                         <p:par>
-                          <p:cTn id="25" fill="hold">
+                          <p:cTn id="35" fill="hold">
                             <p:stCondLst>
                               <p:cond delay="0"/>
                             </p:stCondLst>
                             <p:childTnLst>
                               <p:par>
-                                <p:cTn id="26" presetID="10" presetClass="entr" presetSubtype="0" fill="hold" grpId="0" nodeType="clickEffect">
+                                <p:cTn id="36" presetID="10" presetClass="entr" presetSubtype="0" fill="hold" grpId="0" nodeType="clickEffect">
                                   <p:stCondLst>
                                     <p:cond delay="0"/>
                                   </p:stCondLst>
                                   <p:childTnLst>
                                     <p:set>
                                       <p:cBhvr>
-                                        <p:cTn id="27" dur="1" fill="hold">
+                                        <p:cTn id="37" dur="1" fill="hold">
                                           <p:stCondLst>
                                             <p:cond delay="0"/>
                                           </p:stCondLst>
@@ -35958,7 +36404,7 @@
                                     </p:set>
                                     <p:animEffect transition="in" filter="fade">
                                       <p:cBhvr>
-                                        <p:cTn id="28" dur="500"/>
+                                        <p:cTn id="38" dur="500"/>
                                         <p:tgtEl>
                                           <p:spTgt spid="5">
                                             <p:txEl>
@@ -35978,26 +36424,26 @@
                     </p:cTn>
                   </p:par>
                   <p:par>
-                    <p:cTn id="29" fill="hold">
+                    <p:cTn id="39" fill="hold">
                       <p:stCondLst>
                         <p:cond delay="indefinite"/>
                       </p:stCondLst>
                       <p:childTnLst>
                         <p:par>
-                          <p:cTn id="30" fill="hold">
+                          <p:cTn id="40" fill="hold">
                             <p:stCondLst>
                               <p:cond delay="0"/>
                             </p:stCondLst>
                             <p:childTnLst>
                               <p:par>
-                                <p:cTn id="31" presetID="10" presetClass="entr" presetSubtype="0" fill="hold" grpId="0" nodeType="clickEffect">
+                                <p:cTn id="41" presetID="10" presetClass="entr" presetSubtype="0" fill="hold" grpId="0" nodeType="clickEffect">
                                   <p:stCondLst>
                                     <p:cond delay="0"/>
                                   </p:stCondLst>
                                   <p:childTnLst>
                                     <p:set>
                                       <p:cBhvr>
-                                        <p:cTn id="32" dur="1" fill="hold">
+                                        <p:cTn id="42" dur="1" fill="hold">
                                           <p:stCondLst>
                                             <p:cond delay="0"/>
                                           </p:stCondLst>
@@ -36019,7 +36465,7 @@
                                     </p:set>
                                     <p:animEffect transition="in" filter="fade">
                                       <p:cBhvr>
-                                        <p:cTn id="33" dur="500"/>
+                                        <p:cTn id="43" dur="500"/>
                                         <p:tgtEl>
                                           <p:spTgt spid="5">
                                             <p:txEl>

</xml_diff>